<commit_message>
Update solution for 21-Promenne-Lab. Make exercise 6 optional (= Bonus).
</commit_message>
<xml_diff>
--- a/Pro lektory/Prezentace-CS.pptx
+++ b/Pro lektory/Prezentace-CS.pptx
@@ -2963,16 +2963,25 @@
             </a:r>
             <a:r>
               <a:rPr lang="cs-CZ" sz="2800" dirty="0"/>
-              <a:t> až </a:t>
-            </a:r>
-            <a:r>
-              <a:rPr lang="cs-CZ" sz="2800" dirty="0">
+              <a:t> </a:t>
+            </a:r>
+            <a:r>
+              <a:rPr lang="cs-CZ" sz="2800"/>
+              <a:t>až </a:t>
+            </a:r>
+            <a:r>
+              <a:rPr lang="en-US" sz="2800">
                 <a:solidFill>
                   <a:schemeClr val="accent1"/>
                 </a:solidFill>
               </a:rPr>
-              <a:t>6</a:t>
-            </a:r>
+              <a:t>5</a:t>
+            </a:r>
+            <a:endParaRPr lang="cs-CZ" sz="2800" dirty="0">
+              <a:solidFill>
+                <a:schemeClr val="accent1"/>
+              </a:solidFill>
+            </a:endParaRPr>
           </a:p>
           <a:p>
             <a:pPr marL="0" indent="0" algn="ctr">
@@ -2991,32 +3000,92 @@
               <a:buNone/>
             </a:pPr>
             <a:r>
+              <a:rPr lang="cs-CZ" sz="2400"/>
+              <a:t>Příklady </a:t>
+            </a:r>
+            <a:r>
+              <a:rPr lang="en-US" sz="2400">
+                <a:solidFill>
+                  <a:schemeClr val="accent1"/>
+                </a:solidFill>
+              </a:rPr>
+              <a:t>6</a:t>
+            </a:r>
+            <a:r>
+              <a:rPr lang="cs-CZ" sz="2400">
+                <a:solidFill>
+                  <a:schemeClr val="accent1"/>
+                </a:solidFill>
+              </a:rPr>
+              <a:t> </a:t>
+            </a:r>
+            <a:r>
+              <a:rPr lang="cs-CZ" sz="2400" dirty="0">
+                <a:solidFill>
+                  <a:schemeClr val="accent1"/>
+                </a:solidFill>
+              </a:rPr>
+              <a:t>(BONUS</a:t>
+            </a:r>
+            <a:r>
+              <a:rPr lang="cs-CZ" sz="2400">
+                <a:solidFill>
+                  <a:schemeClr val="accent1"/>
+                </a:solidFill>
+              </a:rPr>
+              <a:t>)</a:t>
+            </a:r>
+            <a:r>
+              <a:rPr lang="cs-CZ" sz="2400"/>
+              <a:t> a</a:t>
+            </a:r>
+            <a:r>
+              <a:rPr lang="en-US" sz="2400"/>
+              <a:t>ž</a:t>
+            </a:r>
+            <a:r>
+              <a:rPr lang="cs-CZ" sz="2400"/>
+              <a:t> </a:t>
+            </a:r>
+            <a:r>
+              <a:rPr lang="cs-CZ" sz="2400" dirty="0">
+                <a:solidFill>
+                  <a:schemeClr val="accent1"/>
+                </a:solidFill>
+              </a:rPr>
+              <a:t>8 (BONUS</a:t>
+            </a:r>
+            <a:r>
+              <a:rPr lang="cs-CZ" sz="2400">
+                <a:solidFill>
+                  <a:schemeClr val="accent1"/>
+                </a:solidFill>
+              </a:rPr>
+              <a:t>)</a:t>
+            </a:r>
+            <a:r>
+              <a:rPr lang="cs-CZ" sz="2400"/>
+              <a:t> udělejte</a:t>
+            </a:r>
+            <a:r>
+              <a:rPr lang="en-US" sz="2400"/>
+              <a:t>,</a:t>
+            </a:r>
+            <a:r>
+              <a:rPr lang="cs-CZ" sz="2400"/>
+              <a:t> </a:t>
+            </a:r>
+            <a:r>
               <a:rPr lang="cs-CZ" sz="2400" dirty="0"/>
-              <a:t>Příklady </a:t>
-            </a:r>
-            <a:r>
-              <a:rPr lang="cs-CZ" sz="2400" dirty="0">
-                <a:solidFill>
-                  <a:schemeClr val="accent1"/>
-                </a:solidFill>
-              </a:rPr>
-              <a:t>7 (BONUS)</a:t>
+              <a:t>pokud budete rychlejší </a:t>
+            </a:r>
+            <a:r>
+              <a:rPr lang="cs-CZ" sz="2400"/>
+              <a:t>než ostatní nebo </a:t>
             </a:r>
             <a:r>
               <a:rPr lang="cs-CZ" sz="2400" dirty="0"/>
-              <a:t> a </a:t>
-            </a:r>
-            <a:r>
-              <a:rPr lang="cs-CZ" sz="2400" dirty="0">
-                <a:solidFill>
-                  <a:schemeClr val="accent1"/>
-                </a:solidFill>
-              </a:rPr>
-              <a:t>8 (BONUS)</a:t>
-            </a:r>
-            <a:r>
-              <a:rPr lang="cs-CZ" sz="2400" dirty="0"/>
-              <a:t> udělejte pokud budete rychlejší než ostatní, v přestávkách nebo v klidu doma ;-)</a:t>
+              <a:t>v klidu doma ;-)</a:t>
             </a:r>
           </a:p>
         </p:txBody>
@@ -8101,8 +8170,29 @@
                   <a:schemeClr val="accent1"/>
                 </a:solidFill>
               </a:rPr>
-              <a:t>Angry_Birds</a:t>
-            </a:r>
+              <a:t>Angry</a:t>
+            </a:r>
+            <a:r>
+              <a:rPr lang="cs-CZ">
+                <a:solidFill>
+                  <a:schemeClr val="accent1"/>
+                </a:solidFill>
+              </a:rPr>
+              <a:t>_Birds</a:t>
+            </a:r>
+            <a:r>
+              <a:rPr lang="en-US">
+                <a:solidFill>
+                  <a:schemeClr val="accent1"/>
+                </a:solidFill>
+              </a:rPr>
+              <a:t>-Lab</a:t>
+            </a:r>
+            <a:endParaRPr lang="cs-CZ" dirty="0">
+              <a:solidFill>
+                <a:schemeClr val="accent1"/>
+              </a:solidFill>
+            </a:endParaRPr>
           </a:p>
           <a:p>
             <a:endParaRPr lang="cs-CZ" dirty="0"/>

</xml_diff>